<commit_message>
Updated slides with dotnet core pre-requisites
</commit_message>
<xml_diff>
--- a/FSharpWorkshop_Slides.pptx
+++ b/FSharpWorkshop_Slides.pptx
@@ -2957,7 +2957,7 @@
           <a:p>
             <a:fld id="{20EA5F0D-C1DC-412F-A146-DDB3A74B588F}" type="datetimeFigureOut">
               <a:rPr lang="en-US"/>
-              <a:t>8/10/2017</a:t>
+              <a:t>9/26/18</a:t>
             </a:fld>
             <a:endParaRPr/>
           </a:p>
@@ -3122,7 +3122,7 @@
           <a:p>
             <a:fld id="{A8CDE508-72C8-4AB5-AA9C-1584D31690E0}" type="datetimeFigureOut">
               <a:rPr lang="en-US"/>
-              <a:t>8/10/2017</a:t>
+              <a:t>9/26/18</a:t>
             </a:fld>
             <a:endParaRPr/>
           </a:p>
@@ -3186,35 +3186,30 @@
           <a:p>
             <a:pPr lvl="0"/>
             <a:r>
-              <a:rPr/>
               <a:t>Click to edit Master text styles</a:t>
             </a:r>
           </a:p>
           <a:p>
             <a:pPr lvl="1"/>
             <a:r>
-              <a:rPr/>
               <a:t>Second level</a:t>
             </a:r>
           </a:p>
           <a:p>
             <a:pPr lvl="2"/>
             <a:r>
-              <a:rPr/>
               <a:t>Third level</a:t>
             </a:r>
           </a:p>
           <a:p>
             <a:pPr lvl="3"/>
             <a:r>
-              <a:rPr/>
               <a:t>Fourth level</a:t>
             </a:r>
           </a:p>
           <a:p>
             <a:pPr lvl="4"/>
             <a:r>
-              <a:rPr/>
               <a:t>Fifth level</a:t>
             </a:r>
           </a:p>
@@ -3847,7 +3842,7 @@
           <a:p>
             <a:fld id="{4BDF68E2-58F2-4D09-BE8B-E3BD06533059}" type="datetimeFigureOut">
               <a:rPr lang="en-US" smtClean="0"/>
-              <a:t>8/10/2017</a:t>
+              <a:t>9/26/18</a:t>
             </a:fld>
             <a:endParaRPr lang="en-US" dirty="0"/>
           </a:p>
@@ -4067,7 +4062,7 @@
           <a:p>
             <a:fld id="{9E583DDF-CA54-461A-A486-592D2374C532}" type="datetimeFigureOut">
               <a:rPr lang="en-US" smtClean="0"/>
-              <a:t>8/10/2017</a:t>
+              <a:t>9/26/18</a:t>
             </a:fld>
             <a:endParaRPr lang="en-US"/>
           </a:p>
@@ -4335,7 +4330,7 @@
           <a:p>
             <a:fld id="{9E583DDF-CA54-461A-A486-592D2374C532}" type="datetimeFigureOut">
               <a:rPr lang="en-US" smtClean="0"/>
-              <a:t>8/10/2017</a:t>
+              <a:t>9/26/18</a:t>
             </a:fld>
             <a:endParaRPr lang="en-US"/>
           </a:p>
@@ -4517,7 +4512,7 @@
           <a:p>
             <a:fld id="{9E583DDF-CA54-461A-A486-592D2374C532}" type="datetimeFigureOut">
               <a:rPr lang="en-US" smtClean="0"/>
-              <a:t>8/10/2017</a:t>
+              <a:t>9/26/18</a:t>
             </a:fld>
             <a:endParaRPr lang="en-US"/>
           </a:p>
@@ -4872,7 +4867,7 @@
           <a:p>
             <a:fld id="{9E583DDF-CA54-461A-A486-592D2374C532}" type="datetimeFigureOut">
               <a:rPr lang="en-US" smtClean="0"/>
-              <a:t>8/10/2017</a:t>
+              <a:t>9/26/18</a:t>
             </a:fld>
             <a:endParaRPr lang="en-US"/>
           </a:p>
@@ -5159,7 +5154,7 @@
           <a:p>
             <a:fld id="{0A879FD0-C37A-4F50-8F3B-5FA0D9D0B42F}" type="datetimeFigureOut">
               <a:rPr lang="en-US" smtClean="0"/>
-              <a:t>8/10/2017</a:t>
+              <a:t>9/26/18</a:t>
             </a:fld>
             <a:endParaRPr lang="en-US"/>
           </a:p>
@@ -5550,7 +5545,7 @@
           <a:p>
             <a:fld id="{9E583DDF-CA54-461A-A486-592D2374C532}" type="datetimeFigureOut">
               <a:rPr lang="en-US" smtClean="0"/>
-              <a:t>8/10/2017</a:t>
+              <a:t>9/26/18</a:t>
             </a:fld>
             <a:endParaRPr lang="en-US"/>
           </a:p>
@@ -5680,7 +5675,7 @@
           <a:p>
             <a:fld id="{9E583DDF-CA54-461A-A486-592D2374C532}" type="datetimeFigureOut">
               <a:rPr lang="en-US" smtClean="0"/>
-              <a:t>8/10/2017</a:t>
+              <a:t>9/26/18</a:t>
             </a:fld>
             <a:endParaRPr lang="en-US"/>
           </a:p>
@@ -5863,7 +5858,7 @@
           <a:p>
             <a:fld id="{9E583DDF-CA54-461A-A486-592D2374C532}" type="datetimeFigureOut">
               <a:rPr lang="en-US" smtClean="0"/>
-              <a:t>8/10/2017</a:t>
+              <a:t>9/26/18</a:t>
             </a:fld>
             <a:endParaRPr lang="en-US"/>
           </a:p>
@@ -6229,7 +6224,7 @@
           <a:p>
             <a:fld id="{9E583DDF-CA54-461A-A486-592D2374C532}" type="datetimeFigureOut">
               <a:rPr lang="en-US" smtClean="0"/>
-              <a:t>8/10/2017</a:t>
+              <a:t>9/26/18</a:t>
             </a:fld>
             <a:endParaRPr lang="en-US"/>
           </a:p>
@@ -6618,7 +6613,7 @@
           <a:p>
             <a:fld id="{9E583DDF-CA54-461A-A486-592D2374C532}" type="datetimeFigureOut">
               <a:rPr lang="en-US" smtClean="0"/>
-              <a:t>8/10/2017</a:t>
+              <a:t>9/26/18</a:t>
             </a:fld>
             <a:endParaRPr lang="en-US"/>
           </a:p>
@@ -6918,7 +6913,7 @@
             <a:fld id="{9E583DDF-CA54-461A-A486-592D2374C532}" type="datetimeFigureOut">
               <a:rPr lang="en-US" smtClean="0"/>
               <a:pPr/>
-              <a:t>8/10/2017</a:t>
+              <a:t>9/26/18</a:t>
             </a:fld>
             <a:endParaRPr lang="en-US"/>
           </a:p>
@@ -19537,54 +19532,17 @@
             </a:pPr>
             <a:r>
               <a:rPr lang="en-US" sz="4000" dirty="0"/>
-              <a:t> Windows</a:t>
-            </a:r>
-          </a:p>
-          <a:p>
-            <a:pPr lvl="1">
-              <a:buFont typeface="Calibri" panose="020F0502020204030204" pitchFamily="34" charset="0"/>
-              <a:buChar char="&gt;"/>
-            </a:pPr>
-            <a:r>
-              <a:rPr lang="en-US" sz="2400" dirty="0"/>
-              <a:t> Visual Studio 2015 Community or</a:t>
-            </a:r>
-          </a:p>
-          <a:p>
-            <a:pPr lvl="1">
-              <a:buFont typeface="Calibri" panose="020F0502020204030204" pitchFamily="34" charset="0"/>
-              <a:buChar char="&gt;"/>
-            </a:pPr>
-            <a:r>
-              <a:rPr lang="en-US" sz="2400" dirty="0"/>
-              <a:t> Visual Studio Code + F# Compiler + </a:t>
-            </a:r>
-            <a:r>
-              <a:rPr lang="en-US" sz="2400" dirty="0" err="1"/>
-              <a:t>Ionide</a:t>
-            </a:r>
-            <a:r>
-              <a:rPr lang="en-US" sz="2400" dirty="0"/>
-              <a:t> package or</a:t>
-            </a:r>
-          </a:p>
-          <a:p>
-            <a:pPr lvl="1">
-              <a:buFont typeface="Calibri" panose="020F0502020204030204" pitchFamily="34" charset="0"/>
-              <a:buChar char="&gt;"/>
-            </a:pPr>
-            <a:r>
-              <a:rPr lang="en-US" sz="2400" dirty="0"/>
-              <a:t> Atom + F# Compiler + </a:t>
-            </a:r>
-            <a:r>
-              <a:rPr lang="en-US" sz="2400" dirty="0" err="1"/>
-              <a:t>Ionide</a:t>
-            </a:r>
-            <a:r>
-              <a:rPr lang="en-US" sz="2400" dirty="0"/>
-              <a:t> package </a:t>
-            </a:r>
+              <a:t> </a:t>
+            </a:r>
+            <a:r>
+              <a:rPr lang="en-US" sz="4000" dirty="0" err="1"/>
+              <a:t>.Net</a:t>
+            </a:r>
+            <a:r>
+              <a:rPr lang="en-US" sz="4000" dirty="0"/>
+              <a:t> Core SDK</a:t>
+            </a:r>
+            <a:endParaRPr lang="en-US" sz="2400" dirty="0"/>
           </a:p>
           <a:p>
             <a:pPr>
@@ -19593,45 +19551,8 @@
             </a:pPr>
             <a:r>
               <a:rPr lang="en-US" sz="4000" dirty="0"/>
-              <a:t> Linux</a:t>
-            </a:r>
-          </a:p>
-          <a:p>
-            <a:pPr lvl="1">
-              <a:buFont typeface="Calibri" panose="020F0502020204030204" pitchFamily="34" charset="0"/>
-              <a:buChar char="&gt;"/>
-            </a:pPr>
-            <a:r>
-              <a:rPr lang="en-US" sz="2400" dirty="0"/>
-              <a:t> Visual Studio Code + Mono + </a:t>
-            </a:r>
-            <a:r>
-              <a:rPr lang="en-US" sz="2400" dirty="0" err="1"/>
-              <a:t>Ionide</a:t>
-            </a:r>
-            <a:r>
-              <a:rPr lang="en-US" sz="2400" dirty="0"/>
-              <a:t> package or</a:t>
-            </a:r>
-          </a:p>
-          <a:p>
-            <a:pPr lvl="1">
-              <a:buFont typeface="Calibri" panose="020F0502020204030204" pitchFamily="34" charset="0"/>
-              <a:buChar char="&gt;"/>
-            </a:pPr>
-            <a:r>
-              <a:rPr lang="en-US" sz="2400" dirty="0"/>
-              <a:t> Atom + Mono + </a:t>
-            </a:r>
-            <a:r>
-              <a:rPr lang="en-US" sz="2400" dirty="0" err="1"/>
-              <a:t>Ionide</a:t>
-            </a:r>
-            <a:r>
-              <a:rPr lang="en-US" sz="2400" dirty="0"/>
-              <a:t> package </a:t>
-            </a:r>
-            <a:endParaRPr lang="en-US" sz="2200" dirty="0"/>
+              <a:t> Visual Studio Code</a:t>
+            </a:r>
           </a:p>
           <a:p>
             <a:pPr>
@@ -19640,72 +19561,17 @@
             </a:pPr>
             <a:r>
               <a:rPr lang="en-US" sz="4000" dirty="0"/>
-              <a:t> Mac</a:t>
-            </a:r>
-          </a:p>
-          <a:p>
-            <a:pPr lvl="1">
-              <a:buFont typeface="Calibri" panose="020F0502020204030204" pitchFamily="34" charset="0"/>
-              <a:buChar char="&gt;"/>
-            </a:pPr>
-            <a:r>
-              <a:rPr lang="en-US" sz="2400" dirty="0"/>
-              <a:t> Visual Studio for Mac + Mono or</a:t>
-            </a:r>
-          </a:p>
-          <a:p>
-            <a:pPr lvl="1">
-              <a:buFont typeface="Calibri" panose="020F0502020204030204" pitchFamily="34" charset="0"/>
-              <a:buChar char="&gt;"/>
-            </a:pPr>
-            <a:r>
-              <a:rPr lang="en-US" sz="2400" dirty="0"/>
               <a:t> </a:t>
             </a:r>
             <a:r>
-              <a:rPr lang="en-US" sz="2400" dirty="0" err="1"/>
-              <a:t>Xamarin</a:t>
-            </a:r>
-            <a:r>
-              <a:rPr lang="en-US" sz="2400" dirty="0"/>
-              <a:t> Studio 6.x + Mono or</a:t>
-            </a:r>
-          </a:p>
-          <a:p>
-            <a:pPr lvl="1">
-              <a:buFont typeface="Calibri" panose="020F0502020204030204" pitchFamily="34" charset="0"/>
-              <a:buChar char="&gt;"/>
-            </a:pPr>
-            <a:r>
-              <a:rPr lang="en-US" sz="2400" dirty="0"/>
-              <a:t> Visual Studio Code + Mono + </a:t>
-            </a:r>
-            <a:r>
-              <a:rPr lang="en-US" sz="2400" dirty="0" err="1"/>
+              <a:rPr lang="en-US" sz="4000" dirty="0" err="1"/>
               <a:t>Ionide</a:t>
             </a:r>
             <a:r>
-              <a:rPr lang="en-US" sz="2400" dirty="0"/>
-              <a:t> package or </a:t>
-            </a:r>
-          </a:p>
-          <a:p>
-            <a:pPr lvl="1">
-              <a:buFont typeface="Calibri" panose="020F0502020204030204" pitchFamily="34" charset="0"/>
-              <a:buChar char="&gt;"/>
-            </a:pPr>
-            <a:r>
-              <a:rPr lang="en-US" sz="2400" dirty="0"/>
-              <a:t> Atom + Mono + </a:t>
-            </a:r>
-            <a:r>
-              <a:rPr lang="en-US" sz="2400" dirty="0" err="1"/>
-              <a:t>Ionide</a:t>
-            </a:r>
-            <a:r>
-              <a:rPr lang="en-US" sz="2400" dirty="0"/>
-              <a:t> package</a:t>
-            </a:r>
+              <a:rPr lang="en-US" sz="4000" dirty="0"/>
+              <a:t> Package</a:t>
+            </a:r>
+            <a:endParaRPr lang="en-US" sz="2400" dirty="0"/>
           </a:p>
         </p:txBody>
       </p:sp>
@@ -19717,8 +19583,8 @@
         </p:nvSpPr>
         <p:spPr>
           <a:xfrm>
-            <a:off x="7004672" y="4529379"/>
-            <a:ext cx="4232762" cy="1631216"/>
+            <a:off x="6126480" y="1925664"/>
+            <a:ext cx="5017720" cy="1938992"/>
           </a:xfrm>
           <a:prstGeom prst="rect">
             <a:avLst/>
@@ -19748,7 +19614,7 @@
               <a:buNone/>
             </a:pPr>
             <a:r>
-              <a:rPr lang="en-US" sz="2000" dirty="0"/>
+              <a:rPr lang="en-US" sz="2400" dirty="0"/>
               <a:t>Download links:</a:t>
             </a:r>
           </a:p>
@@ -19757,7 +19623,7 @@
               <a:buNone/>
             </a:pPr>
             <a:r>
-              <a:rPr lang="en-US" sz="2000" dirty="0"/>
+              <a:rPr lang="en-US" sz="2400" dirty="0"/>
               <a:t>fsharpworkshop.com/#pre-requisites</a:t>
             </a:r>
           </a:p>
@@ -19765,14 +19631,14 @@
             <a:pPr marL="45720" indent="0">
               <a:buNone/>
             </a:pPr>
-            <a:endParaRPr lang="en-AU" sz="2000" dirty="0"/>
+            <a:endParaRPr lang="en-AU" sz="2400" dirty="0"/>
           </a:p>
           <a:p>
             <a:pPr marL="45720" indent="0">
               <a:buNone/>
             </a:pPr>
             <a:r>
-              <a:rPr lang="en-AU" sz="2000" dirty="0"/>
+              <a:rPr lang="en-AU" sz="2400" dirty="0"/>
               <a:t>See also the “Before we start” section </a:t>
             </a:r>
           </a:p>
@@ -19781,10 +19647,10 @@
               <a:buNone/>
             </a:pPr>
             <a:r>
-              <a:rPr lang="en-AU" sz="2000" dirty="0"/>
+              <a:rPr lang="en-AU" sz="2400" dirty="0"/>
               <a:t>on the Exercises Guide</a:t>
             </a:r>
-            <a:endParaRPr lang="en-US" sz="2000" dirty="0"/>
+            <a:endParaRPr lang="en-US" sz="2400" dirty="0"/>
           </a:p>
         </p:txBody>
       </p:sp>
@@ -21838,11 +21704,7 @@
             </a:r>
             <a:r>
               <a:rPr lang="en-AU" sz="2000" dirty="0"/>
-              <a:t> = </a:t>
-            </a:r>
-            <a:r>
-              <a:rPr lang="en-AU" sz="2000" dirty="0"/>
-              <a:t>filter (</a:t>
+              <a:t> = filter (</a:t>
             </a:r>
             <a:r>
               <a:rPr lang="en-AU" sz="2000" dirty="0">
@@ -21878,13 +21740,8 @@
             </a:r>
             <a:r>
               <a:rPr lang="en-AU" sz="2000" dirty="0"/>
-              <a:t> n -&gt; n &gt; 10) </a:t>
-            </a:r>
-            <a:r>
-              <a:rPr lang="en-AU" sz="2000" dirty="0"/>
-              <a:t>numbers)</a:t>
-            </a:r>
-            <a:endParaRPr lang="en-AU" sz="2000" dirty="0"/>
+              <a:t> n -&gt; n &gt; 10) numbers)</a:t>
+            </a:r>
           </a:p>
         </p:txBody>
       </p:sp>
@@ -39800,10 +39657,10 @@
         </p:nvGrpSpPr>
         <p:grpSpPr>
           <a:xfrm>
-            <a:off x="4528162" y="927527"/>
-            <a:ext cx="6627518" cy="5390996"/>
-            <a:chOff x="4528162" y="927527"/>
-            <a:chExt cx="6627518" cy="5390996"/>
+            <a:off x="3549512" y="927527"/>
+            <a:ext cx="7606168" cy="5390996"/>
+            <a:chOff x="3549512" y="927527"/>
+            <a:chExt cx="7606168" cy="5390996"/>
           </a:xfrm>
         </p:grpSpPr>
         <p:sp>
@@ -40253,7 +40110,7 @@
           </p:nvSpPr>
           <p:spPr>
             <a:xfrm>
-              <a:off x="4528162" y="5551385"/>
+              <a:off x="3549512" y="5579858"/>
               <a:ext cx="2736304" cy="738664"/>
             </a:xfrm>
             <a:prstGeom prst="rect">
@@ -50116,12 +49973,6 @@
 </file>
 
 <file path=customXml/item1.xml><?xml version="1.0" encoding="utf-8"?>
-<p:properties xmlns:p="http://schemas.microsoft.com/office/2006/metadata/properties" xmlns:xsi="http://www.w3.org/2001/XMLSchema-instance" xmlns:pc="http://schemas.microsoft.com/office/infopath/2007/PartnerControls">
-  <documentManagement/>
-</p:properties>
-</file>
-
-<file path=customXml/item2.xml><?xml version="1.0" encoding="utf-8"?>
 <ct:contentTypeSchema xmlns:ct="http://schemas.microsoft.com/office/2006/metadata/contentType" xmlns:ma="http://schemas.microsoft.com/office/2006/metadata/properties/metaAttributes" ct:_="" ma:_="" ma:contentTypeName="Document" ma:contentTypeID="0x0101007C1D5F340F01F94FA2FD29A5E6DC872E" ma:contentTypeVersion="0" ma:contentTypeDescription="Create a new document." ma:contentTypeScope="" ma:versionID="f583bd66513a361a730282b6a794e352">
   <xsd:schema xmlns:xsd="http://www.w3.org/2001/XMLSchema" xmlns:xs="http://www.w3.org/2001/XMLSchema" xmlns:p="http://schemas.microsoft.com/office/2006/metadata/properties" targetNamespace="http://schemas.microsoft.com/office/2006/metadata/properties" ma:root="true" ma:fieldsID="6841151cf538834e171094e4faaf2d73">
     <xsd:element name="properties">
@@ -50235,7 +50086,7 @@
 </ct:contentTypeSchema>
 </file>
 
-<file path=customXml/item3.xml><?xml version="1.0" encoding="utf-8"?>
+<file path=customXml/item2.xml><?xml version="1.0" encoding="utf-8"?>
 <?mso-contentType ?>
 <FormTemplates xmlns="http://schemas.microsoft.com/sharepoint/v3/contenttype/forms">
   <Display>DocumentLibraryForm</Display>
@@ -50244,22 +50095,13 @@
 </FormTemplates>
 </file>
 
-<file path=customXml/itemProps1.xml><?xml version="1.0" encoding="utf-8"?>
-<ds:datastoreItem xmlns:ds="http://schemas.openxmlformats.org/officeDocument/2006/customXml" ds:itemID="{9A69BF48-D9C3-4DE0-818A-0C2EC431B649}">
-  <ds:schemaRefs>
-    <ds:schemaRef ds:uri="http://purl.org/dc/elements/1.1/"/>
-    <ds:schemaRef ds:uri="http://schemas.microsoft.com/office/infopath/2007/PartnerControls"/>
-    <ds:schemaRef ds:uri="http://schemas.microsoft.com/office/2006/documentManagement/types"/>
-    <ds:schemaRef ds:uri="http://www.w3.org/XML/1998/namespace"/>
-    <ds:schemaRef ds:uri="http://purl.org/dc/dcmitype/"/>
-    <ds:schemaRef ds:uri="http://purl.org/dc/terms/"/>
-    <ds:schemaRef ds:uri="http://schemas.openxmlformats.org/package/2006/metadata/core-properties"/>
-    <ds:schemaRef ds:uri="http://schemas.microsoft.com/office/2006/metadata/properties"/>
-  </ds:schemaRefs>
-</ds:datastoreItem>
+<file path=customXml/item3.xml><?xml version="1.0" encoding="utf-8"?>
+<p:properties xmlns:p="http://schemas.microsoft.com/office/2006/metadata/properties" xmlns:xsi="http://www.w3.org/2001/XMLSchema-instance" xmlns:pc="http://schemas.microsoft.com/office/infopath/2007/PartnerControls">
+  <documentManagement/>
+</p:properties>
 </file>
 
-<file path=customXml/itemProps2.xml><?xml version="1.0" encoding="utf-8"?>
+<file path=customXml/itemProps1.xml><?xml version="1.0" encoding="utf-8"?>
 <ds:datastoreItem xmlns:ds="http://schemas.openxmlformats.org/officeDocument/2006/customXml" ds:itemID="{566C857B-E52C-4200-9223-45EEE86CA270}">
   <ds:schemaRefs>
     <ds:schemaRef ds:uri="http://schemas.microsoft.com/office/2006/metadata/contentType"/>
@@ -50275,10 +50117,25 @@
 </ds:datastoreItem>
 </file>
 
-<file path=customXml/itemProps3.xml><?xml version="1.0" encoding="utf-8"?>
+<file path=customXml/itemProps2.xml><?xml version="1.0" encoding="utf-8"?>
 <ds:datastoreItem xmlns:ds="http://schemas.openxmlformats.org/officeDocument/2006/customXml" ds:itemID="{13DE0ED7-AE8B-4CE1-892D-805FE0D473B5}">
   <ds:schemaRefs>
     <ds:schemaRef ds:uri="http://schemas.microsoft.com/sharepoint/v3/contenttype/forms"/>
   </ds:schemaRefs>
 </ds:datastoreItem>
+</file>
+
+<file path=customXml/itemProps3.xml><?xml version="1.0" encoding="utf-8"?>
+<ds:datastoreItem xmlns:ds="http://schemas.openxmlformats.org/officeDocument/2006/customXml" ds:itemID="{9A69BF48-D9C3-4DE0-818A-0C2EC431B649}">
+  <ds:schemaRefs>
+    <ds:schemaRef ds:uri="http://purl.org/dc/elements/1.1/"/>
+    <ds:schemaRef ds:uri="http://schemas.microsoft.com/office/infopath/2007/PartnerControls"/>
+    <ds:schemaRef ds:uri="http://schemas.microsoft.com/office/2006/documentManagement/types"/>
+    <ds:schemaRef ds:uri="http://www.w3.org/XML/1998/namespace"/>
+    <ds:schemaRef ds:uri="http://purl.org/dc/dcmitype/"/>
+    <ds:schemaRef ds:uri="http://purl.org/dc/terms/"/>
+    <ds:schemaRef ds:uri="http://schemas.openxmlformats.org/package/2006/metadata/core-properties"/>
+    <ds:schemaRef ds:uri="http://schemas.microsoft.com/office/2006/metadata/properties"/>
+  </ds:schemaRefs>
+</ds:datastoreItem>
 </file>
</xml_diff>

<commit_message>
Added mono dependency to docs
</commit_message>
<xml_diff>
--- a/FSharpWorkshop_Slides.pptx
+++ b/FSharpWorkshop_Slides.pptx
@@ -2957,7 +2957,7 @@
           <a:p>
             <a:fld id="{20EA5F0D-C1DC-412F-A146-DDB3A74B588F}" type="datetimeFigureOut">
               <a:rPr lang="en-US"/>
-              <a:t>9/26/18</a:t>
+              <a:t>5/10/19</a:t>
             </a:fld>
             <a:endParaRPr/>
           </a:p>
@@ -3122,7 +3122,7 @@
           <a:p>
             <a:fld id="{A8CDE508-72C8-4AB5-AA9C-1584D31690E0}" type="datetimeFigureOut">
               <a:rPr lang="en-US"/>
-              <a:t>9/26/18</a:t>
+              <a:t>5/10/19</a:t>
             </a:fld>
             <a:endParaRPr/>
           </a:p>
@@ -3842,7 +3842,7 @@
           <a:p>
             <a:fld id="{4BDF68E2-58F2-4D09-BE8B-E3BD06533059}" type="datetimeFigureOut">
               <a:rPr lang="en-US" smtClean="0"/>
-              <a:t>9/26/18</a:t>
+              <a:t>5/10/19</a:t>
             </a:fld>
             <a:endParaRPr lang="en-US" dirty="0"/>
           </a:p>
@@ -4062,7 +4062,7 @@
           <a:p>
             <a:fld id="{9E583DDF-CA54-461A-A486-592D2374C532}" type="datetimeFigureOut">
               <a:rPr lang="en-US" smtClean="0"/>
-              <a:t>9/26/18</a:t>
+              <a:t>5/10/19</a:t>
             </a:fld>
             <a:endParaRPr lang="en-US"/>
           </a:p>
@@ -4330,7 +4330,7 @@
           <a:p>
             <a:fld id="{9E583DDF-CA54-461A-A486-592D2374C532}" type="datetimeFigureOut">
               <a:rPr lang="en-US" smtClean="0"/>
-              <a:t>9/26/18</a:t>
+              <a:t>5/10/19</a:t>
             </a:fld>
             <a:endParaRPr lang="en-US"/>
           </a:p>
@@ -4512,7 +4512,7 @@
           <a:p>
             <a:fld id="{9E583DDF-CA54-461A-A486-592D2374C532}" type="datetimeFigureOut">
               <a:rPr lang="en-US" smtClean="0"/>
-              <a:t>9/26/18</a:t>
+              <a:t>5/10/19</a:t>
             </a:fld>
             <a:endParaRPr lang="en-US"/>
           </a:p>
@@ -4867,7 +4867,7 @@
           <a:p>
             <a:fld id="{9E583DDF-CA54-461A-A486-592D2374C532}" type="datetimeFigureOut">
               <a:rPr lang="en-US" smtClean="0"/>
-              <a:t>9/26/18</a:t>
+              <a:t>5/10/19</a:t>
             </a:fld>
             <a:endParaRPr lang="en-US"/>
           </a:p>
@@ -5154,7 +5154,7 @@
           <a:p>
             <a:fld id="{0A879FD0-C37A-4F50-8F3B-5FA0D9D0B42F}" type="datetimeFigureOut">
               <a:rPr lang="en-US" smtClean="0"/>
-              <a:t>9/26/18</a:t>
+              <a:t>5/10/19</a:t>
             </a:fld>
             <a:endParaRPr lang="en-US"/>
           </a:p>
@@ -5545,7 +5545,7 @@
           <a:p>
             <a:fld id="{9E583DDF-CA54-461A-A486-592D2374C532}" type="datetimeFigureOut">
               <a:rPr lang="en-US" smtClean="0"/>
-              <a:t>9/26/18</a:t>
+              <a:t>5/10/19</a:t>
             </a:fld>
             <a:endParaRPr lang="en-US"/>
           </a:p>
@@ -5675,7 +5675,7 @@
           <a:p>
             <a:fld id="{9E583DDF-CA54-461A-A486-592D2374C532}" type="datetimeFigureOut">
               <a:rPr lang="en-US" smtClean="0"/>
-              <a:t>9/26/18</a:t>
+              <a:t>5/10/19</a:t>
             </a:fld>
             <a:endParaRPr lang="en-US"/>
           </a:p>
@@ -5858,7 +5858,7 @@
           <a:p>
             <a:fld id="{9E583DDF-CA54-461A-A486-592D2374C532}" type="datetimeFigureOut">
               <a:rPr lang="en-US" smtClean="0"/>
-              <a:t>9/26/18</a:t>
+              <a:t>5/10/19</a:t>
             </a:fld>
             <a:endParaRPr lang="en-US"/>
           </a:p>
@@ -6224,7 +6224,7 @@
           <a:p>
             <a:fld id="{9E583DDF-CA54-461A-A486-592D2374C532}" type="datetimeFigureOut">
               <a:rPr lang="en-US" smtClean="0"/>
-              <a:t>9/26/18</a:t>
+              <a:t>5/10/19</a:t>
             </a:fld>
             <a:endParaRPr lang="en-US"/>
           </a:p>
@@ -6613,7 +6613,7 @@
           <a:p>
             <a:fld id="{9E583DDF-CA54-461A-A486-592D2374C532}" type="datetimeFigureOut">
               <a:rPr lang="en-US" smtClean="0"/>
-              <a:t>9/26/18</a:t>
+              <a:t>5/10/19</a:t>
             </a:fld>
             <a:endParaRPr lang="en-US"/>
           </a:p>
@@ -6913,7 +6913,7 @@
             <a:fld id="{9E583DDF-CA54-461A-A486-592D2374C532}" type="datetimeFigureOut">
               <a:rPr lang="en-US" smtClean="0"/>
               <a:pPr/>
-              <a:t>9/26/18</a:t>
+              <a:t>5/10/19</a:t>
             </a:fld>
             <a:endParaRPr lang="en-US"/>
           </a:p>
@@ -19571,6 +19571,29 @@
               <a:rPr lang="en-US" sz="4000" dirty="0"/>
               <a:t> Package</a:t>
             </a:r>
+          </a:p>
+          <a:p>
+            <a:pPr>
+              <a:buFont typeface="Calibri" panose="020F0502020204030204" pitchFamily="34" charset="0"/>
+              <a:buChar char="&gt;"/>
+            </a:pPr>
+            <a:r>
+              <a:rPr lang="en-US" sz="4000" dirty="0"/>
+              <a:t> Mono </a:t>
+            </a:r>
+            <a:br>
+              <a:rPr lang="en-US" sz="4000" dirty="0"/>
+            </a:br>
+            <a:r>
+              <a:rPr lang="en-US" sz="4000" dirty="0"/>
+              <a:t>  (Mac or Linux only)</a:t>
+            </a:r>
+          </a:p>
+          <a:p>
+            <a:pPr>
+              <a:buFont typeface="Calibri" panose="020F0502020204030204" pitchFamily="34" charset="0"/>
+              <a:buChar char="&gt;"/>
+            </a:pPr>
             <a:endParaRPr lang="en-US" sz="2400" dirty="0"/>
           </a:p>
         </p:txBody>
@@ -49973,6 +49996,21 @@
 </file>
 
 <file path=customXml/item1.xml><?xml version="1.0" encoding="utf-8"?>
+<?mso-contentType ?>
+<FormTemplates xmlns="http://schemas.microsoft.com/sharepoint/v3/contenttype/forms">
+  <Display>DocumentLibraryForm</Display>
+  <Edit>DocumentLibraryForm</Edit>
+  <New>DocumentLibraryForm</New>
+</FormTemplates>
+</file>
+
+<file path=customXml/item2.xml><?xml version="1.0" encoding="utf-8"?>
+<p:properties xmlns:p="http://schemas.microsoft.com/office/2006/metadata/properties" xmlns:xsi="http://www.w3.org/2001/XMLSchema-instance" xmlns:pc="http://schemas.microsoft.com/office/infopath/2007/PartnerControls">
+  <documentManagement/>
+</p:properties>
+</file>
+
+<file path=customXml/item3.xml><?xml version="1.0" encoding="utf-8"?>
 <ct:contentTypeSchema xmlns:ct="http://schemas.microsoft.com/office/2006/metadata/contentType" xmlns:ma="http://schemas.microsoft.com/office/2006/metadata/properties/metaAttributes" ct:_="" ma:_="" ma:contentTypeName="Document" ma:contentTypeID="0x0101007C1D5F340F01F94FA2FD29A5E6DC872E" ma:contentTypeVersion="0" ma:contentTypeDescription="Create a new document." ma:contentTypeScope="" ma:versionID="f583bd66513a361a730282b6a794e352">
   <xsd:schema xmlns:xsd="http://www.w3.org/2001/XMLSchema" xmlns:xs="http://www.w3.org/2001/XMLSchema" xmlns:p="http://schemas.microsoft.com/office/2006/metadata/properties" targetNamespace="http://schemas.microsoft.com/office/2006/metadata/properties" ma:root="true" ma:fieldsID="6841151cf538834e171094e4faaf2d73">
     <xsd:element name="properties">
@@ -50086,22 +50124,30 @@
 </ct:contentTypeSchema>
 </file>
 
-<file path=customXml/item2.xml><?xml version="1.0" encoding="utf-8"?>
-<?mso-contentType ?>
-<FormTemplates xmlns="http://schemas.microsoft.com/sharepoint/v3/contenttype/forms">
-  <Display>DocumentLibraryForm</Display>
-  <Edit>DocumentLibraryForm</Edit>
-  <New>DocumentLibraryForm</New>
-</FormTemplates>
+<file path=customXml/itemProps1.xml><?xml version="1.0" encoding="utf-8"?>
+<ds:datastoreItem xmlns:ds="http://schemas.openxmlformats.org/officeDocument/2006/customXml" ds:itemID="{13DE0ED7-AE8B-4CE1-892D-805FE0D473B5}">
+  <ds:schemaRefs>
+    <ds:schemaRef ds:uri="http://schemas.microsoft.com/sharepoint/v3/contenttype/forms"/>
+  </ds:schemaRefs>
+</ds:datastoreItem>
 </file>
 
-<file path=customXml/item3.xml><?xml version="1.0" encoding="utf-8"?>
-<p:properties xmlns:p="http://schemas.microsoft.com/office/2006/metadata/properties" xmlns:xsi="http://www.w3.org/2001/XMLSchema-instance" xmlns:pc="http://schemas.microsoft.com/office/infopath/2007/PartnerControls">
-  <documentManagement/>
-</p:properties>
+<file path=customXml/itemProps2.xml><?xml version="1.0" encoding="utf-8"?>
+<ds:datastoreItem xmlns:ds="http://schemas.openxmlformats.org/officeDocument/2006/customXml" ds:itemID="{9A69BF48-D9C3-4DE0-818A-0C2EC431B649}">
+  <ds:schemaRefs>
+    <ds:schemaRef ds:uri="http://purl.org/dc/elements/1.1/"/>
+    <ds:schemaRef ds:uri="http://schemas.microsoft.com/office/infopath/2007/PartnerControls"/>
+    <ds:schemaRef ds:uri="http://schemas.microsoft.com/office/2006/documentManagement/types"/>
+    <ds:schemaRef ds:uri="http://www.w3.org/XML/1998/namespace"/>
+    <ds:schemaRef ds:uri="http://purl.org/dc/dcmitype/"/>
+    <ds:schemaRef ds:uri="http://purl.org/dc/terms/"/>
+    <ds:schemaRef ds:uri="http://schemas.openxmlformats.org/package/2006/metadata/core-properties"/>
+    <ds:schemaRef ds:uri="http://schemas.microsoft.com/office/2006/metadata/properties"/>
+  </ds:schemaRefs>
+</ds:datastoreItem>
 </file>
 
-<file path=customXml/itemProps1.xml><?xml version="1.0" encoding="utf-8"?>
+<file path=customXml/itemProps3.xml><?xml version="1.0" encoding="utf-8"?>
 <ds:datastoreItem xmlns:ds="http://schemas.openxmlformats.org/officeDocument/2006/customXml" ds:itemID="{566C857B-E52C-4200-9223-45EEE86CA270}">
   <ds:schemaRefs>
     <ds:schemaRef ds:uri="http://schemas.microsoft.com/office/2006/metadata/contentType"/>
@@ -50115,27 +50161,4 @@
     <ds:schemaRef ds:uri="http://schemas.microsoft.com/office/infopath/2007/PartnerControls"/>
   </ds:schemaRefs>
 </ds:datastoreItem>
-</file>
-
-<file path=customXml/itemProps2.xml><?xml version="1.0" encoding="utf-8"?>
-<ds:datastoreItem xmlns:ds="http://schemas.openxmlformats.org/officeDocument/2006/customXml" ds:itemID="{13DE0ED7-AE8B-4CE1-892D-805FE0D473B5}">
-  <ds:schemaRefs>
-    <ds:schemaRef ds:uri="http://schemas.microsoft.com/sharepoint/v3/contenttype/forms"/>
-  </ds:schemaRefs>
-</ds:datastoreItem>
-</file>
-
-<file path=customXml/itemProps3.xml><?xml version="1.0" encoding="utf-8"?>
-<ds:datastoreItem xmlns:ds="http://schemas.openxmlformats.org/officeDocument/2006/customXml" ds:itemID="{9A69BF48-D9C3-4DE0-818A-0C2EC431B649}">
-  <ds:schemaRefs>
-    <ds:schemaRef ds:uri="http://purl.org/dc/elements/1.1/"/>
-    <ds:schemaRef ds:uri="http://schemas.microsoft.com/office/infopath/2007/PartnerControls"/>
-    <ds:schemaRef ds:uri="http://schemas.microsoft.com/office/2006/documentManagement/types"/>
-    <ds:schemaRef ds:uri="http://www.w3.org/XML/1998/namespace"/>
-    <ds:schemaRef ds:uri="http://purl.org/dc/dcmitype/"/>
-    <ds:schemaRef ds:uri="http://purl.org/dc/terms/"/>
-    <ds:schemaRef ds:uri="http://schemas.openxmlformats.org/package/2006/metadata/core-properties"/>
-    <ds:schemaRef ds:uri="http://schemas.microsoft.com/office/2006/metadata/properties"/>
-  </ds:schemaRefs>
-</ds:datastoreItem>
 </file>
</xml_diff>